<commit_message>
Some minor changes on PHP Basics - Session and Cookies slide
</commit_message>
<xml_diff>
--- a/slides/Pingo - PHP Basics - Cookies - Sessions.pptx
+++ b/slides/Pingo - PHP Basics - Cookies - Sessions.pptx
@@ -270,7 +270,7 @@
           <a:p>
             <a:fld id="{18771FEF-67D8-4D47-9E32-8D782F1657B6}" type="datetimeFigureOut">
               <a:rPr lang="en-US" smtClean="0"/>
-              <a:t>7/31/14</a:t>
+              <a:t>8/2/14</a:t>
             </a:fld>
             <a:endParaRPr lang="en-US"/>
           </a:p>
@@ -485,7 +485,7 @@
           <a:p>
             <a:fld id="{18771FEF-67D8-4D47-9E32-8D782F1657B6}" type="datetimeFigureOut">
               <a:rPr lang="en-US" smtClean="0"/>
-              <a:t>7/31/14</a:t>
+              <a:t>8/2/14</a:t>
             </a:fld>
             <a:endParaRPr lang="en-US"/>
           </a:p>
@@ -710,7 +710,7 @@
           <a:p>
             <a:fld id="{18771FEF-67D8-4D47-9E32-8D782F1657B6}" type="datetimeFigureOut">
               <a:rPr lang="en-US" smtClean="0"/>
-              <a:t>7/31/14</a:t>
+              <a:t>8/2/14</a:t>
             </a:fld>
             <a:endParaRPr lang="en-US"/>
           </a:p>
@@ -5556,7 +5556,7 @@
           <a:p>
             <a:fld id="{18771FEF-67D8-4D47-9E32-8D782F1657B6}" type="datetimeFigureOut">
               <a:rPr lang="en-US" smtClean="0"/>
-              <a:t>7/31/14</a:t>
+              <a:t>8/2/14</a:t>
             </a:fld>
             <a:endParaRPr lang="en-US"/>
           </a:p>
@@ -5787,7 +5787,7 @@
           <a:p>
             <a:fld id="{18771FEF-67D8-4D47-9E32-8D782F1657B6}" type="datetimeFigureOut">
               <a:rPr lang="en-US" smtClean="0"/>
-              <a:t>7/31/14</a:t>
+              <a:t>8/2/14</a:t>
             </a:fld>
             <a:endParaRPr lang="en-US"/>
           </a:p>
@@ -6114,7 +6114,7 @@
           <a:p>
             <a:fld id="{18771FEF-67D8-4D47-9E32-8D782F1657B6}" type="datetimeFigureOut">
               <a:rPr lang="en-US" smtClean="0"/>
-              <a:t>7/31/14</a:t>
+              <a:t>8/2/14</a:t>
             </a:fld>
             <a:endParaRPr lang="en-US"/>
           </a:p>
@@ -6575,7 +6575,7 @@
           <a:p>
             <a:fld id="{18771FEF-67D8-4D47-9E32-8D782F1657B6}" type="datetimeFigureOut">
               <a:rPr lang="en-US" smtClean="0"/>
-              <a:t>7/31/14</a:t>
+              <a:t>8/2/14</a:t>
             </a:fld>
             <a:endParaRPr lang="en-US"/>
           </a:p>
@@ -6732,7 +6732,7 @@
           <a:p>
             <a:fld id="{18771FEF-67D8-4D47-9E32-8D782F1657B6}" type="datetimeFigureOut">
               <a:rPr lang="en-US" smtClean="0"/>
-              <a:t>7/31/14</a:t>
+              <a:t>8/2/14</a:t>
             </a:fld>
             <a:endParaRPr lang="en-US"/>
           </a:p>
@@ -6868,7 +6868,7 @@
           <a:p>
             <a:fld id="{18771FEF-67D8-4D47-9E32-8D782F1657B6}" type="datetimeFigureOut">
               <a:rPr lang="en-US" smtClean="0"/>
-              <a:t>7/31/14</a:t>
+              <a:t>8/2/14</a:t>
             </a:fld>
             <a:endParaRPr lang="en-US"/>
           </a:p>
@@ -7190,7 +7190,7 @@
           <a:p>
             <a:fld id="{18771FEF-67D8-4D47-9E32-8D782F1657B6}" type="datetimeFigureOut">
               <a:rPr lang="en-US" smtClean="0"/>
-              <a:t>7/31/14</a:t>
+              <a:t>8/2/14</a:t>
             </a:fld>
             <a:endParaRPr lang="en-US"/>
           </a:p>
@@ -7492,7 +7492,7 @@
           <a:p>
             <a:fld id="{18771FEF-67D8-4D47-9E32-8D782F1657B6}" type="datetimeFigureOut">
               <a:rPr lang="en-US" smtClean="0"/>
-              <a:t>7/31/14</a:t>
+              <a:t>8/2/14</a:t>
             </a:fld>
             <a:endParaRPr lang="en-US"/>
           </a:p>
@@ -7742,7 +7742,7 @@
           <a:p>
             <a:fld id="{18771FEF-67D8-4D47-9E32-8D782F1657B6}" type="datetimeFigureOut">
               <a:rPr lang="en-US" smtClean="0"/>
-              <a:t>7/31/14</a:t>
+              <a:t>8/2/14</a:t>
             </a:fld>
             <a:endParaRPr lang="en-US"/>
           </a:p>
@@ -9984,12 +9984,12 @@
               <a:t>This command will set the cookie called age on </a:t>
             </a:r>
             <a:r>
-              <a:rPr lang="en-US" sz="2000" dirty="0" err="1"/>
-              <a:t>theuser’s</a:t>
+              <a:rPr lang="en-US" sz="2000" dirty="0" smtClean="0"/>
+              <a:t>the user’s </a:t>
             </a:r>
             <a:r>
               <a:rPr lang="en-US" sz="2000" dirty="0"/>
-              <a:t> PC containing the data 20. It will be available to all pages in the same directory or subdirectory of the page that set it (the default path and domain). It will expire and be deleted after 30 days</a:t>
+              <a:t>PC containing the data 20. It will be available to all pages in the same directory or subdirectory of the page that set it (the default path and domain). It will expire and be deleted after 30 days</a:t>
             </a:r>
             <a:r>
               <a:rPr lang="en-US" sz="2000" dirty="0" smtClean="0"/>
@@ -10088,12 +10088,12 @@
               <a:t>This command will set the cookie called gender on </a:t>
             </a:r>
             <a:r>
-              <a:rPr lang="en-US" sz="2000" dirty="0" err="1"/>
-              <a:t>theuser’s</a:t>
+              <a:rPr lang="en-US" sz="2000" dirty="0" smtClean="0"/>
+              <a:t>the user’s </a:t>
             </a:r>
             <a:r>
               <a:rPr lang="en-US" sz="2000" dirty="0"/>
-              <a:t> PC containing the data male. It will be available within the entire domain that set it. It will expire and be deleted when the browser is closed.</a:t>
+              <a:t>PC containing the data male. It will be available within the entire domain that set it. It will expire and be deleted when the browser is closed.</a:t>
             </a:r>
           </a:p>
         </p:txBody>
@@ -10832,8 +10832,13 @@
             </a:pPr>
             <a:r>
               <a:rPr lang="en-US" dirty="0"/>
-              <a:t>To remove a cookie, simply overwrite the cookie with a new one with an expiry time in the pass</a:t>
-            </a:r>
+              <a:t>To remove a cookie, simply overwrite the cookie with a new one with an expiry time in the </a:t>
+            </a:r>
+            <a:r>
+              <a:rPr lang="en-US" dirty="0" smtClean="0"/>
+              <a:t>past</a:t>
+            </a:r>
+            <a:endParaRPr lang="en-US" dirty="0"/>
           </a:p>
           <a:p>
             <a:pPr marL="0" indent="0">
@@ -11799,7 +11804,7 @@
             </a:r>
             <a:r>
               <a:rPr lang="en-US" dirty="0" err="1" smtClean="0"/>
-              <a:t>secookie</a:t>
+              <a:t>setcookie</a:t>
             </a:r>
             <a:r>
               <a:rPr lang="en-US" dirty="0" smtClean="0"/>
@@ -12376,7 +12381,155 @@
                   </a:innerShdw>
                 </a:effectLst>
               </a:rPr>
-              <a:t>    $_SESSION['name'] = $</a:t>
+              <a:t>    $_SESSION</a:t>
+            </a:r>
+            <a:r>
+              <a:rPr lang="tr-TR" sz="2600" dirty="0" smtClean="0">
+                <a:ln w="1905"/>
+                <a:gradFill>
+                  <a:gsLst>
+                    <a:gs pos="0">
+                      <a:schemeClr val="accent6">
+                        <a:shade val="20000"/>
+                        <a:satMod val="200000"/>
+                      </a:schemeClr>
+                    </a:gs>
+                    <a:gs pos="78000">
+                      <a:schemeClr val="accent6">
+                        <a:tint val="90000"/>
+                        <a:shade val="89000"/>
+                        <a:satMod val="220000"/>
+                      </a:schemeClr>
+                    </a:gs>
+                    <a:gs pos="100000">
+                      <a:schemeClr val="accent6">
+                        <a:tint val="12000"/>
+                        <a:satMod val="255000"/>
+                      </a:schemeClr>
+                    </a:gs>
+                  </a:gsLst>
+                  <a:lin ang="5400000"/>
+                </a:gradFill>
+                <a:effectLst>
+                  <a:innerShdw blurRad="69850" dist="43180" dir="5400000">
+                    <a:srgbClr val="000000">
+                      <a:alpha val="65000"/>
+                    </a:srgbClr>
+                  </a:innerShdw>
+                </a:effectLst>
+              </a:rPr>
+              <a:t>[‘</a:t>
+            </a:r>
+            <a:r>
+              <a:rPr lang="tr-TR" sz="2600" dirty="0" err="1" smtClean="0">
+                <a:ln w="1905"/>
+                <a:gradFill>
+                  <a:gsLst>
+                    <a:gs pos="0">
+                      <a:schemeClr val="accent6">
+                        <a:shade val="20000"/>
+                        <a:satMod val="200000"/>
+                      </a:schemeClr>
+                    </a:gs>
+                    <a:gs pos="78000">
+                      <a:schemeClr val="accent6">
+                        <a:tint val="90000"/>
+                        <a:shade val="89000"/>
+                        <a:satMod val="220000"/>
+                      </a:schemeClr>
+                    </a:gs>
+                    <a:gs pos="100000">
+                      <a:schemeClr val="accent6">
+                        <a:tint val="12000"/>
+                        <a:satMod val="255000"/>
+                      </a:schemeClr>
+                    </a:gs>
+                  </a:gsLst>
+                  <a:lin ang="5400000"/>
+                </a:gradFill>
+                <a:effectLst>
+                  <a:innerShdw blurRad="69850" dist="43180" dir="5400000">
+                    <a:srgbClr val="000000">
+                      <a:alpha val="65000"/>
+                    </a:srgbClr>
+                  </a:innerShdw>
+                </a:effectLst>
+              </a:rPr>
+              <a:t>age</a:t>
+            </a:r>
+            <a:r>
+              <a:rPr lang="tr-TR" sz="2600" dirty="0" smtClean="0">
+                <a:ln w="1905"/>
+                <a:gradFill>
+                  <a:gsLst>
+                    <a:gs pos="0">
+                      <a:schemeClr val="accent6">
+                        <a:shade val="20000"/>
+                        <a:satMod val="200000"/>
+                      </a:schemeClr>
+                    </a:gs>
+                    <a:gs pos="78000">
+                      <a:schemeClr val="accent6">
+                        <a:tint val="90000"/>
+                        <a:shade val="89000"/>
+                        <a:satMod val="220000"/>
+                      </a:schemeClr>
+                    </a:gs>
+                    <a:gs pos="100000">
+                      <a:schemeClr val="accent6">
+                        <a:tint val="12000"/>
+                        <a:satMod val="255000"/>
+                      </a:schemeClr>
+                    </a:gs>
+                  </a:gsLst>
+                  <a:lin ang="5400000"/>
+                </a:gradFill>
+                <a:effectLst>
+                  <a:innerShdw blurRad="69850" dist="43180" dir="5400000">
+                    <a:srgbClr val="000000">
+                      <a:alpha val="65000"/>
+                    </a:srgbClr>
+                  </a:innerShdw>
+                </a:effectLst>
+              </a:rPr>
+              <a:t>'</a:t>
+            </a:r>
+            <a:r>
+              <a:rPr lang="tr-TR" sz="2600" dirty="0">
+                <a:ln w="1905"/>
+                <a:gradFill>
+                  <a:gsLst>
+                    <a:gs pos="0">
+                      <a:schemeClr val="accent6">
+                        <a:shade val="20000"/>
+                        <a:satMod val="200000"/>
+                      </a:schemeClr>
+                    </a:gs>
+                    <a:gs pos="78000">
+                      <a:schemeClr val="accent6">
+                        <a:tint val="90000"/>
+                        <a:shade val="89000"/>
+                        <a:satMod val="220000"/>
+                      </a:schemeClr>
+                    </a:gs>
+                    <a:gs pos="100000">
+                      <a:schemeClr val="accent6">
+                        <a:tint val="12000"/>
+                        <a:satMod val="255000"/>
+                      </a:schemeClr>
+                    </a:gs>
+                  </a:gsLst>
+                  <a:lin ang="5400000"/>
+                </a:gradFill>
+                <a:effectLst>
+                  <a:innerShdw blurRad="69850" dist="43180" dir="5400000">
+                    <a:srgbClr val="000000">
+                      <a:alpha val="65000"/>
+                    </a:srgbClr>
+                  </a:innerShdw>
+                </a:effectLst>
+              </a:rPr>
+              <a:t>] = $</a:t>
             </a:r>
             <a:r>
               <a:rPr lang="tr-TR" sz="2600" dirty="0" err="1">
@@ -12885,7 +13038,155 @@
                   </a:innerShdw>
                 </a:effectLst>
               </a:rPr>
-              <a:t> = $_SESSION['name'];</a:t>
+              <a:t> = $_SESSION</a:t>
+            </a:r>
+            <a:r>
+              <a:rPr lang="tr-TR" sz="2600" dirty="0" smtClean="0">
+                <a:ln w="1905"/>
+                <a:gradFill>
+                  <a:gsLst>
+                    <a:gs pos="0">
+                      <a:schemeClr val="accent6">
+                        <a:shade val="20000"/>
+                        <a:satMod val="200000"/>
+                      </a:schemeClr>
+                    </a:gs>
+                    <a:gs pos="78000">
+                      <a:schemeClr val="accent6">
+                        <a:tint val="90000"/>
+                        <a:shade val="89000"/>
+                        <a:satMod val="220000"/>
+                      </a:schemeClr>
+                    </a:gs>
+                    <a:gs pos="100000">
+                      <a:schemeClr val="accent6">
+                        <a:tint val="12000"/>
+                        <a:satMod val="255000"/>
+                      </a:schemeClr>
+                    </a:gs>
+                  </a:gsLst>
+                  <a:lin ang="5400000"/>
+                </a:gradFill>
+                <a:effectLst>
+                  <a:innerShdw blurRad="69850" dist="43180" dir="5400000">
+                    <a:srgbClr val="000000">
+                      <a:alpha val="65000"/>
+                    </a:srgbClr>
+                  </a:innerShdw>
+                </a:effectLst>
+              </a:rPr>
+              <a:t>[’</a:t>
+            </a:r>
+            <a:r>
+              <a:rPr lang="tr-TR" sz="2600" dirty="0" err="1" smtClean="0">
+                <a:ln w="1905"/>
+                <a:gradFill>
+                  <a:gsLst>
+                    <a:gs pos="0">
+                      <a:schemeClr val="accent6">
+                        <a:shade val="20000"/>
+                        <a:satMod val="200000"/>
+                      </a:schemeClr>
+                    </a:gs>
+                    <a:gs pos="78000">
+                      <a:schemeClr val="accent6">
+                        <a:tint val="90000"/>
+                        <a:shade val="89000"/>
+                        <a:satMod val="220000"/>
+                      </a:schemeClr>
+                    </a:gs>
+                    <a:gs pos="100000">
+                      <a:schemeClr val="accent6">
+                        <a:tint val="12000"/>
+                        <a:satMod val="255000"/>
+                      </a:schemeClr>
+                    </a:gs>
+                  </a:gsLst>
+                  <a:lin ang="5400000"/>
+                </a:gradFill>
+                <a:effectLst>
+                  <a:innerShdw blurRad="69850" dist="43180" dir="5400000">
+                    <a:srgbClr val="000000">
+                      <a:alpha val="65000"/>
+                    </a:srgbClr>
+                  </a:innerShdw>
+                </a:effectLst>
+              </a:rPr>
+              <a:t>age</a:t>
+            </a:r>
+            <a:r>
+              <a:rPr lang="tr-TR" sz="2600" dirty="0" smtClean="0">
+                <a:ln w="1905"/>
+                <a:gradFill>
+                  <a:gsLst>
+                    <a:gs pos="0">
+                      <a:schemeClr val="accent6">
+                        <a:shade val="20000"/>
+                        <a:satMod val="200000"/>
+                      </a:schemeClr>
+                    </a:gs>
+                    <a:gs pos="78000">
+                      <a:schemeClr val="accent6">
+                        <a:tint val="90000"/>
+                        <a:shade val="89000"/>
+                        <a:satMod val="220000"/>
+                      </a:schemeClr>
+                    </a:gs>
+                    <a:gs pos="100000">
+                      <a:schemeClr val="accent6">
+                        <a:tint val="12000"/>
+                        <a:satMod val="255000"/>
+                      </a:schemeClr>
+                    </a:gs>
+                  </a:gsLst>
+                  <a:lin ang="5400000"/>
+                </a:gradFill>
+                <a:effectLst>
+                  <a:innerShdw blurRad="69850" dist="43180" dir="5400000">
+                    <a:srgbClr val="000000">
+                      <a:alpha val="65000"/>
+                    </a:srgbClr>
+                  </a:innerShdw>
+                </a:effectLst>
+              </a:rPr>
+              <a:t>'</a:t>
+            </a:r>
+            <a:r>
+              <a:rPr lang="tr-TR" sz="2600" dirty="0">
+                <a:ln w="1905"/>
+                <a:gradFill>
+                  <a:gsLst>
+                    <a:gs pos="0">
+                      <a:schemeClr val="accent6">
+                        <a:shade val="20000"/>
+                        <a:satMod val="200000"/>
+                      </a:schemeClr>
+                    </a:gs>
+                    <a:gs pos="78000">
+                      <a:schemeClr val="accent6">
+                        <a:tint val="90000"/>
+                        <a:shade val="89000"/>
+                        <a:satMod val="220000"/>
+                      </a:schemeClr>
+                    </a:gs>
+                    <a:gs pos="100000">
+                      <a:schemeClr val="accent6">
+                        <a:tint val="12000"/>
+                        <a:satMod val="255000"/>
+                      </a:schemeClr>
+                    </a:gs>
+                  </a:gsLst>
+                  <a:lin ang="5400000"/>
+                </a:gradFill>
+                <a:effectLst>
+                  <a:innerShdw blurRad="69850" dist="43180" dir="5400000">
+                    <a:srgbClr val="000000">
+                      <a:alpha val="65000"/>
+                    </a:srgbClr>
+                  </a:innerShdw>
+                </a:effectLst>
+              </a:rPr>
+              <a:t>];</a:t>
             </a:r>
           </a:p>
           <a:p>
@@ -13172,7 +13473,11 @@
             </a:pPr>
             <a:r>
               <a:rPr lang="en-US" sz="2600" dirty="0" smtClean="0"/>
-              <a:t>It s read in whenever </a:t>
+              <a:t>It’s </a:t>
+            </a:r>
+            <a:r>
+              <a:rPr lang="en-US" sz="2600" dirty="0" smtClean="0"/>
+              <a:t>read in whenever </a:t>
             </a:r>
             <a:r>
               <a:rPr lang="en-US" sz="2600" dirty="0" err="1" smtClean="0">
@@ -13214,12 +13519,12 @@
               <a:t> is a </a:t>
             </a:r>
             <a:r>
-              <a:rPr lang="en-US" sz="2600" dirty="0" err="1" smtClean="0"/>
-              <a:t>cooike</a:t>
-            </a:r>
-            <a:r>
               <a:rPr lang="en-US" sz="2600" dirty="0" smtClean="0"/>
-              <a:t> that expires when the browser is closed. Cookie properties can be modified with </a:t>
+              <a:t>cookie that </a:t>
+            </a:r>
+            <a:r>
+              <a:rPr lang="en-US" sz="2600" dirty="0" smtClean="0"/>
+              <a:t>expires when the browser is closed. Cookie properties can be modified with </a:t>
             </a:r>
             <a:r>
               <a:rPr lang="en-US" sz="2600" dirty="0" err="1" smtClean="0">

</xml_diff>